<commit_message>
tambah materi dasar fungsi
</commit_message>
<xml_diff>
--- a/dunia ilkom/fungsi/2 Pengertian Parameter dan Argumen Fungsi C++.pptx
+++ b/dunia ilkom/fungsi/2 Pengertian Parameter dan Argumen Fungsi C++.pptx
@@ -6,6 +6,9 @@
   </p:sldMasterIdLst>
   <p:sldIdLst>
     <p:sldId id="256" r:id="rId2"/>
+    <p:sldId id="257" r:id="rId3"/>
+    <p:sldId id="258" r:id="rId4"/>
+    <p:sldId id="259" r:id="rId5"/>
   </p:sldIdLst>
   <p:sldSz cx="12192000" cy="6858000"/>
   <p:notesSz cx="6858000" cy="9144000"/>
@@ -267,7 +270,7 @@
           <a:p>
             <a:fld id="{CA430C0A-5464-4FE4-84EB-FF9C94016DF4}" type="datetimeFigureOut">
               <a:rPr lang="en-US" dirty="0"/>
-              <a:t>5/20/2021</a:t>
+              <a:t>5/29/2021</a:t>
             </a:fld>
             <a:endParaRPr lang="en-US" dirty="0"/>
           </a:p>
@@ -433,7 +436,7 @@
           <a:p>
             <a:fld id="{E9F9C37B-1D36-470B-8223-D6C91242EC14}" type="datetimeFigureOut">
               <a:rPr lang="en-US" dirty="0"/>
-              <a:t>5/20/2021</a:t>
+              <a:t>5/29/2021</a:t>
             </a:fld>
             <a:endParaRPr lang="en-US" dirty="0"/>
           </a:p>
@@ -608,7 +611,7 @@
           <a:p>
             <a:fld id="{67C6F52A-A82B-47A2-A83A-8C4C91F2D59F}" type="datetimeFigureOut">
               <a:rPr lang="en-US" dirty="0"/>
-              <a:t>5/20/2021</a:t>
+              <a:t>5/29/2021</a:t>
             </a:fld>
             <a:endParaRPr lang="en-US" dirty="0"/>
           </a:p>
@@ -773,7 +776,7 @@
           <a:p>
             <a:fld id="{F070A7B3-6521-4DCA-87E5-044747A908C1}" type="datetimeFigureOut">
               <a:rPr lang="en-US" dirty="0"/>
-              <a:t>5/20/2021</a:t>
+              <a:t>5/29/2021</a:t>
             </a:fld>
             <a:endParaRPr lang="en-US" dirty="0"/>
           </a:p>
@@ -1029,7 +1032,7 @@
           <a:p>
             <a:fld id="{360C6404-AD6E-4860-8E75-697CA40B95DA}" type="datetimeFigureOut">
               <a:rPr lang="en-US" dirty="0"/>
-              <a:t>5/20/2021</a:t>
+              <a:t>5/29/2021</a:t>
             </a:fld>
             <a:endParaRPr lang="en-US" dirty="0"/>
           </a:p>
@@ -1257,7 +1260,7 @@
           <a:p>
             <a:fld id="{AB134690-1557-4C89-A502-4959FE7FAD70}" type="datetimeFigureOut">
               <a:rPr lang="en-US" dirty="0"/>
-              <a:t>5/20/2021</a:t>
+              <a:t>5/29/2021</a:t>
             </a:fld>
             <a:endParaRPr lang="en-US" dirty="0"/>
           </a:p>
@@ -1607,7 +1610,7 @@
           <a:p>
             <a:fld id="{4F7D4976-E339-4826-83B7-FBD03F55ECF8}" type="datetimeFigureOut">
               <a:rPr lang="en-US" dirty="0"/>
-              <a:t>5/20/2021</a:t>
+              <a:t>5/29/2021</a:t>
             </a:fld>
             <a:endParaRPr lang="en-US" dirty="0"/>
           </a:p>
@@ -1743,7 +1746,7 @@
           <a:p>
             <a:fld id="{E1037C31-9E7A-4F99-8774-A0E530DE1A42}" type="datetimeFigureOut">
               <a:rPr lang="en-US" dirty="0"/>
-              <a:t>5/20/2021</a:t>
+              <a:t>5/29/2021</a:t>
             </a:fld>
             <a:endParaRPr lang="en-US" dirty="0"/>
           </a:p>
@@ -1833,7 +1836,7 @@
           <a:p>
             <a:fld id="{C278504F-A551-4DE0-9316-4DCD1D8CC752}" type="datetimeFigureOut">
               <a:rPr lang="en-US" dirty="0"/>
-              <a:t>5/20/2021</a:t>
+              <a:t>5/29/2021</a:t>
             </a:fld>
             <a:endParaRPr lang="en-US" dirty="0"/>
           </a:p>
@@ -2185,7 +2188,7 @@
           <a:p>
             <a:fld id="{D1BE4249-C0D0-4B06-8692-E8BB871AF643}" type="datetimeFigureOut">
               <a:rPr lang="en-US" dirty="0"/>
-              <a:t>5/20/2021</a:t>
+              <a:t>5/29/2021</a:t>
             </a:fld>
             <a:endParaRPr lang="en-US" dirty="0"/>
           </a:p>
@@ -2498,7 +2501,7 @@
           <a:p>
             <a:fld id="{042B0DB6-F5C7-45FB-8CF3-31B45F9C2DAC}" type="datetimeFigureOut">
               <a:rPr lang="en-US" dirty="0"/>
-              <a:t>5/20/2021</a:t>
+              <a:t>5/29/2021</a:t>
             </a:fld>
             <a:endParaRPr lang="en-US" dirty="0"/>
           </a:p>
@@ -2738,7 +2741,7 @@
           <a:p>
             <a:fld id="{1160EA64-D806-43AC-9DF2-F8C432F32B4C}" type="datetimeFigureOut">
               <a:rPr lang="en-US" dirty="0"/>
-              <a:t>5/20/2021</a:t>
+              <a:t>5/29/2021</a:t>
             </a:fld>
             <a:endParaRPr lang="en-US" dirty="0"/>
           </a:p>
@@ -3209,10 +3212,11 @@
         <p:spPr/>
         <p:txBody>
           <a:bodyPr>
-            <a:normAutofit fontScale="90000"/>
+            <a:normAutofit/>
           </a:bodyPr>
           <a:lstStyle/>
           <a:p>
+            <a:pPr fontAlgn="base"/>
             <a:r>
               <a:rPr lang="en-US" b="0" i="0" dirty="0" err="1">
                 <a:solidFill>
@@ -3221,7 +3225,7 @@
                 <a:effectLst/>
                 <a:latin typeface="Raleway"/>
               </a:rPr>
-              <a:t>Struktur</a:t>
+              <a:t>Pengertian</a:t>
             </a:r>
             <a:r>
               <a:rPr lang="en-US" b="0" i="0" dirty="0">
@@ -3231,7 +3235,7 @@
                 <a:effectLst/>
                 <a:latin typeface="Raleway"/>
               </a:rPr>
-              <a:t> Dasar Bahasa </a:t>
+              <a:t> Parameter dan </a:t>
             </a:r>
             <a:r>
               <a:rPr lang="en-US" b="0" i="0" dirty="0" err="1">
@@ -3241,7 +3245,27 @@
                 <a:effectLst/>
                 <a:latin typeface="Raleway"/>
               </a:rPr>
-              <a:t>Pemrograman</a:t>
+              <a:t>Argumen</a:t>
+            </a:r>
+            <a:r>
+              <a:rPr lang="en-US" b="0" i="0" dirty="0">
+                <a:solidFill>
+                  <a:srgbClr val="2B2C33"/>
+                </a:solidFill>
+                <a:effectLst/>
+                <a:latin typeface="Raleway"/>
+              </a:rPr>
+              <a:t> </a:t>
+            </a:r>
+            <a:r>
+              <a:rPr lang="en-US" b="0" i="0" dirty="0" err="1">
+                <a:solidFill>
+                  <a:srgbClr val="2B2C33"/>
+                </a:solidFill>
+                <a:effectLst/>
+                <a:latin typeface="Raleway"/>
+              </a:rPr>
+              <a:t>Fungsi</a:t>
             </a:r>
             <a:r>
               <a:rPr lang="en-US" b="0" i="0" dirty="0">
@@ -3253,16 +3277,6 @@
               </a:rPr>
               <a:t> C++</a:t>
             </a:r>
-            <a:br>
-              <a:rPr lang="en-US" b="0" i="0" dirty="0">
-                <a:solidFill>
-                  <a:srgbClr val="2B2C33"/>
-                </a:solidFill>
-                <a:effectLst/>
-                <a:latin typeface="Raleway"/>
-              </a:rPr>
-            </a:br>
-            <a:endParaRPr lang="en-US" dirty="0"/>
           </a:p>
         </p:txBody>
       </p:sp>
@@ -3295,6 +3309,529 @@
     <p:extLst>
       <p:ext uri="{BB962C8B-B14F-4D97-AF65-F5344CB8AC3E}">
         <p14:creationId xmlns:p14="http://schemas.microsoft.com/office/powerpoint/2010/main" val="3642559057"/>
+      </p:ext>
+    </p:extLst>
+  </p:cSld>
+  <p:clrMapOvr>
+    <a:masterClrMapping/>
+  </p:clrMapOvr>
+</p:sld>
+</file>
+
+<file path=ppt/slides/slide2.xml><?xml version="1.0" encoding="utf-8"?>
+<p:sld xmlns:a="http://schemas.openxmlformats.org/drawingml/2006/main" xmlns:r="http://schemas.openxmlformats.org/officeDocument/2006/relationships" xmlns:p="http://schemas.openxmlformats.org/presentationml/2006/main">
+  <p:cSld>
+    <p:spTree>
+      <p:nvGrpSpPr>
+        <p:cNvPr id="1" name=""/>
+        <p:cNvGrpSpPr/>
+        <p:nvPr/>
+      </p:nvGrpSpPr>
+      <p:grpSpPr>
+        <a:xfrm>
+          <a:off x="0" y="0"/>
+          <a:ext cx="0" cy="0"/>
+          <a:chOff x="0" y="0"/>
+          <a:chExt cx="0" cy="0"/>
+        </a:xfrm>
+      </p:grpSpPr>
+      <p:sp>
+        <p:nvSpPr>
+          <p:cNvPr id="2" name="Title 1">
+            <a:extLst>
+              <a:ext uri="{FF2B5EF4-FFF2-40B4-BE49-F238E27FC236}">
+                <a16:creationId xmlns:a16="http://schemas.microsoft.com/office/drawing/2014/main" id="{F992766B-BCB2-419F-A920-3BCB7FC6D1D5}"/>
+              </a:ext>
+            </a:extLst>
+          </p:cNvPr>
+          <p:cNvSpPr>
+            <a:spLocks noGrp="1"/>
+          </p:cNvSpPr>
+          <p:nvPr>
+            <p:ph type="title"/>
+          </p:nvPr>
+        </p:nvSpPr>
+        <p:spPr/>
+        <p:txBody>
+          <a:bodyPr>
+            <a:normAutofit fontScale="90000"/>
+          </a:bodyPr>
+          <a:lstStyle/>
+          <a:p>
+            <a:r>
+              <a:rPr lang="en-US" b="0" i="0" dirty="0" err="1">
+                <a:solidFill>
+                  <a:srgbClr val="2B2C33"/>
+                </a:solidFill>
+                <a:effectLst/>
+                <a:latin typeface="Raleway"/>
+              </a:rPr>
+              <a:t>Pengertian</a:t>
+            </a:r>
+            <a:r>
+              <a:rPr lang="en-US" b="0" i="0" dirty="0">
+                <a:solidFill>
+                  <a:srgbClr val="2B2C33"/>
+                </a:solidFill>
+                <a:effectLst/>
+                <a:latin typeface="Raleway"/>
+              </a:rPr>
+              <a:t> Parameter dan </a:t>
+            </a:r>
+            <a:r>
+              <a:rPr lang="en-US" b="0" i="0" dirty="0" err="1">
+                <a:solidFill>
+                  <a:srgbClr val="2B2C33"/>
+                </a:solidFill>
+                <a:effectLst/>
+                <a:latin typeface="Raleway"/>
+              </a:rPr>
+              <a:t>Argumen</a:t>
+            </a:r>
+            <a:r>
+              <a:rPr lang="en-US" b="0" i="0" dirty="0">
+                <a:solidFill>
+                  <a:srgbClr val="2B2C33"/>
+                </a:solidFill>
+                <a:effectLst/>
+                <a:latin typeface="Raleway"/>
+              </a:rPr>
+              <a:t> </a:t>
+            </a:r>
+            <a:r>
+              <a:rPr lang="en-US" b="0" i="0" dirty="0" err="1">
+                <a:solidFill>
+                  <a:srgbClr val="2B2C33"/>
+                </a:solidFill>
+                <a:effectLst/>
+                <a:latin typeface="Raleway"/>
+              </a:rPr>
+              <a:t>Fungsi</a:t>
+            </a:r>
+            <a:r>
+              <a:rPr lang="en-US" b="0" i="0" dirty="0">
+                <a:solidFill>
+                  <a:srgbClr val="2B2C33"/>
+                </a:solidFill>
+                <a:effectLst/>
+                <a:latin typeface="Raleway"/>
+              </a:rPr>
+              <a:t> C++</a:t>
+            </a:r>
+            <a:br>
+              <a:rPr lang="en-US" b="0" i="0" dirty="0">
+                <a:solidFill>
+                  <a:srgbClr val="2B2C33"/>
+                </a:solidFill>
+                <a:effectLst/>
+                <a:latin typeface="Raleway"/>
+              </a:rPr>
+            </a:br>
+            <a:endParaRPr lang="en-US" dirty="0"/>
+          </a:p>
+        </p:txBody>
+      </p:sp>
+      <p:sp>
+        <p:nvSpPr>
+          <p:cNvPr id="3" name="Content Placeholder 2">
+            <a:extLst>
+              <a:ext uri="{FF2B5EF4-FFF2-40B4-BE49-F238E27FC236}">
+                <a16:creationId xmlns:a16="http://schemas.microsoft.com/office/drawing/2014/main" id="{F84B720A-6D9B-484E-91E1-F8912B02E208}"/>
+              </a:ext>
+            </a:extLst>
+          </p:cNvPr>
+          <p:cNvSpPr>
+            <a:spLocks noGrp="1"/>
+          </p:cNvSpPr>
+          <p:nvPr>
+            <p:ph idx="1"/>
+          </p:nvPr>
+        </p:nvSpPr>
+        <p:spPr/>
+        <p:txBody>
+          <a:bodyPr/>
+          <a:lstStyle/>
+          <a:p>
+            <a:endParaRPr lang="en-US"/>
+          </a:p>
+        </p:txBody>
+      </p:sp>
+      <p:pic>
+        <p:nvPicPr>
+          <p:cNvPr id="5" name="Picture 4">
+            <a:extLst>
+              <a:ext uri="{FF2B5EF4-FFF2-40B4-BE49-F238E27FC236}">
+                <a16:creationId xmlns:a16="http://schemas.microsoft.com/office/drawing/2014/main" id="{3F31A62E-0050-4577-9EE9-4F64D911A77D}"/>
+              </a:ext>
+            </a:extLst>
+          </p:cNvPr>
+          <p:cNvPicPr>
+            <a:picLocks noChangeAspect="1"/>
+          </p:cNvPicPr>
+          <p:nvPr/>
+        </p:nvPicPr>
+        <p:blipFill>
+          <a:blip r:embed="rId2"/>
+          <a:stretch>
+            <a:fillRect/>
+          </a:stretch>
+        </p:blipFill>
+        <p:spPr>
+          <a:xfrm>
+            <a:off x="2039842" y="2554264"/>
+            <a:ext cx="8112316" cy="2790145"/>
+          </a:xfrm>
+          <a:prstGeom prst="rect">
+            <a:avLst/>
+          </a:prstGeom>
+        </p:spPr>
+      </p:pic>
+    </p:spTree>
+    <p:extLst>
+      <p:ext uri="{BB962C8B-B14F-4D97-AF65-F5344CB8AC3E}">
+        <p14:creationId xmlns:p14="http://schemas.microsoft.com/office/powerpoint/2010/main" val="423857388"/>
+      </p:ext>
+    </p:extLst>
+  </p:cSld>
+  <p:clrMapOvr>
+    <a:masterClrMapping/>
+  </p:clrMapOvr>
+</p:sld>
+</file>
+
+<file path=ppt/slides/slide3.xml><?xml version="1.0" encoding="utf-8"?>
+<p:sld xmlns:a="http://schemas.openxmlformats.org/drawingml/2006/main" xmlns:r="http://schemas.openxmlformats.org/officeDocument/2006/relationships" xmlns:p="http://schemas.openxmlformats.org/presentationml/2006/main">
+  <p:cSld>
+    <p:spTree>
+      <p:nvGrpSpPr>
+        <p:cNvPr id="1" name=""/>
+        <p:cNvGrpSpPr/>
+        <p:nvPr/>
+      </p:nvGrpSpPr>
+      <p:grpSpPr>
+        <a:xfrm>
+          <a:off x="0" y="0"/>
+          <a:ext cx="0" cy="0"/>
+          <a:chOff x="0" y="0"/>
+          <a:chExt cx="0" cy="0"/>
+        </a:xfrm>
+      </p:grpSpPr>
+      <p:sp>
+        <p:nvSpPr>
+          <p:cNvPr id="2" name="Title 1">
+            <a:extLst>
+              <a:ext uri="{FF2B5EF4-FFF2-40B4-BE49-F238E27FC236}">
+                <a16:creationId xmlns:a16="http://schemas.microsoft.com/office/drawing/2014/main" id="{CCCDBD04-BE28-427F-AD4B-9D8FF0A9C782}"/>
+              </a:ext>
+            </a:extLst>
+          </p:cNvPr>
+          <p:cNvSpPr>
+            <a:spLocks noGrp="1"/>
+          </p:cNvSpPr>
+          <p:nvPr>
+            <p:ph type="title"/>
+          </p:nvPr>
+        </p:nvSpPr>
+        <p:spPr/>
+        <p:txBody>
+          <a:bodyPr/>
+          <a:lstStyle/>
+          <a:p>
+            <a:endParaRPr lang="en-US"/>
+          </a:p>
+        </p:txBody>
+      </p:sp>
+      <p:sp>
+        <p:nvSpPr>
+          <p:cNvPr id="3" name="Content Placeholder 2">
+            <a:extLst>
+              <a:ext uri="{FF2B5EF4-FFF2-40B4-BE49-F238E27FC236}">
+                <a16:creationId xmlns:a16="http://schemas.microsoft.com/office/drawing/2014/main" id="{E96852B4-0E3F-43B3-944F-EF7FF3C6705F}"/>
+              </a:ext>
+            </a:extLst>
+          </p:cNvPr>
+          <p:cNvSpPr>
+            <a:spLocks noGrp="1"/>
+          </p:cNvSpPr>
+          <p:nvPr>
+            <p:ph idx="1"/>
+          </p:nvPr>
+        </p:nvSpPr>
+        <p:spPr/>
+        <p:txBody>
+          <a:bodyPr/>
+          <a:lstStyle/>
+          <a:p>
+            <a:endParaRPr lang="en-US"/>
+          </a:p>
+        </p:txBody>
+      </p:sp>
+      <p:pic>
+        <p:nvPicPr>
+          <p:cNvPr id="5" name="Picture 4">
+            <a:extLst>
+              <a:ext uri="{FF2B5EF4-FFF2-40B4-BE49-F238E27FC236}">
+                <a16:creationId xmlns:a16="http://schemas.microsoft.com/office/drawing/2014/main" id="{4399ABD6-8BBE-4E47-BE38-599EF145CEB2}"/>
+              </a:ext>
+            </a:extLst>
+          </p:cNvPr>
+          <p:cNvPicPr>
+            <a:picLocks noChangeAspect="1"/>
+          </p:cNvPicPr>
+          <p:nvPr/>
+        </p:nvPicPr>
+        <p:blipFill>
+          <a:blip r:embed="rId2"/>
+          <a:stretch>
+            <a:fillRect/>
+          </a:stretch>
+        </p:blipFill>
+        <p:spPr>
+          <a:xfrm>
+            <a:off x="-1" y="2362474"/>
+            <a:ext cx="5440105" cy="2557869"/>
+          </a:xfrm>
+          <a:prstGeom prst="rect">
+            <a:avLst/>
+          </a:prstGeom>
+        </p:spPr>
+      </p:pic>
+      <p:pic>
+        <p:nvPicPr>
+          <p:cNvPr id="7" name="Picture 6">
+            <a:extLst>
+              <a:ext uri="{FF2B5EF4-FFF2-40B4-BE49-F238E27FC236}">
+                <a16:creationId xmlns:a16="http://schemas.microsoft.com/office/drawing/2014/main" id="{5AE1517A-FA54-4907-A70B-84C451A1A082}"/>
+              </a:ext>
+            </a:extLst>
+          </p:cNvPr>
+          <p:cNvPicPr>
+            <a:picLocks noChangeAspect="1"/>
+          </p:cNvPicPr>
+          <p:nvPr/>
+        </p:nvPicPr>
+        <p:blipFill>
+          <a:blip r:embed="rId3"/>
+          <a:stretch>
+            <a:fillRect/>
+          </a:stretch>
+        </p:blipFill>
+        <p:spPr>
+          <a:xfrm>
+            <a:off x="5614761" y="2644931"/>
+            <a:ext cx="6419850" cy="1571625"/>
+          </a:xfrm>
+          <a:prstGeom prst="rect">
+            <a:avLst/>
+          </a:prstGeom>
+        </p:spPr>
+      </p:pic>
+    </p:spTree>
+    <p:extLst>
+      <p:ext uri="{BB962C8B-B14F-4D97-AF65-F5344CB8AC3E}">
+        <p14:creationId xmlns:p14="http://schemas.microsoft.com/office/powerpoint/2010/main" val="3294602659"/>
+      </p:ext>
+    </p:extLst>
+  </p:cSld>
+  <p:clrMapOvr>
+    <a:masterClrMapping/>
+  </p:clrMapOvr>
+</p:sld>
+</file>
+
+<file path=ppt/slides/slide4.xml><?xml version="1.0" encoding="utf-8"?>
+<p:sld xmlns:a="http://schemas.openxmlformats.org/drawingml/2006/main" xmlns:r="http://schemas.openxmlformats.org/officeDocument/2006/relationships" xmlns:p="http://schemas.openxmlformats.org/presentationml/2006/main">
+  <p:cSld>
+    <p:spTree>
+      <p:nvGrpSpPr>
+        <p:cNvPr id="1" name=""/>
+        <p:cNvGrpSpPr/>
+        <p:nvPr/>
+      </p:nvGrpSpPr>
+      <p:grpSpPr>
+        <a:xfrm>
+          <a:off x="0" y="0"/>
+          <a:ext cx="0" cy="0"/>
+          <a:chOff x="0" y="0"/>
+          <a:chExt cx="0" cy="0"/>
+        </a:xfrm>
+      </p:grpSpPr>
+      <p:sp>
+        <p:nvSpPr>
+          <p:cNvPr id="2" name="Title 1">
+            <a:extLst>
+              <a:ext uri="{FF2B5EF4-FFF2-40B4-BE49-F238E27FC236}">
+                <a16:creationId xmlns:a16="http://schemas.microsoft.com/office/drawing/2014/main" id="{12DCF91C-D9D2-4BEB-A8BF-63A13CB794FC}"/>
+              </a:ext>
+            </a:extLst>
+          </p:cNvPr>
+          <p:cNvSpPr>
+            <a:spLocks noGrp="1"/>
+          </p:cNvSpPr>
+          <p:nvPr>
+            <p:ph type="title"/>
+          </p:nvPr>
+        </p:nvSpPr>
+        <p:spPr/>
+        <p:txBody>
+          <a:bodyPr>
+            <a:normAutofit fontScale="90000"/>
+          </a:bodyPr>
+          <a:lstStyle/>
+          <a:p>
+            <a:pPr fontAlgn="base"/>
+            <a:br>
+              <a:rPr lang="en-US" b="0" i="0" dirty="0">
+                <a:solidFill>
+                  <a:srgbClr val="2B2C33"/>
+                </a:solidFill>
+                <a:effectLst/>
+                <a:latin typeface="Raleway"/>
+              </a:rPr>
+            </a:br>
+            <a:r>
+              <a:rPr lang="en-US" b="0" i="0" dirty="0" err="1">
+                <a:solidFill>
+                  <a:srgbClr val="2B2C33"/>
+                </a:solidFill>
+                <a:effectLst/>
+                <a:latin typeface="Raleway"/>
+              </a:rPr>
+              <a:t>Membuat</a:t>
+            </a:r>
+            <a:r>
+              <a:rPr lang="en-US" b="0" i="0" dirty="0">
+                <a:solidFill>
+                  <a:srgbClr val="2B2C33"/>
+                </a:solidFill>
+                <a:effectLst/>
+                <a:latin typeface="Raleway"/>
+              </a:rPr>
+              <a:t> Function </a:t>
+            </a:r>
+            <a:r>
+              <a:rPr lang="en-US" b="0" i="0" dirty="0" err="1">
+                <a:solidFill>
+                  <a:srgbClr val="2B2C33"/>
+                </a:solidFill>
+                <a:effectLst/>
+                <a:latin typeface="Raleway"/>
+              </a:rPr>
+              <a:t>hitungLuasSegitiga</a:t>
+            </a:r>
+            <a:br>
+              <a:rPr lang="en-US">
+                <a:solidFill>
+                  <a:srgbClr val="2B2C33"/>
+                </a:solidFill>
+                <a:latin typeface="Raleway"/>
+              </a:rPr>
+            </a:br>
+            <a:br>
+              <a:rPr lang="en-US" b="0" i="0" dirty="0">
+                <a:solidFill>
+                  <a:srgbClr val="2B2C33"/>
+                </a:solidFill>
+                <a:effectLst/>
+                <a:latin typeface="Raleway"/>
+              </a:rPr>
+            </a:br>
+            <a:br>
+              <a:rPr lang="en-US" dirty="0"/>
+            </a:br>
+            <a:endParaRPr lang="en-US" dirty="0"/>
+          </a:p>
+        </p:txBody>
+      </p:sp>
+      <p:sp>
+        <p:nvSpPr>
+          <p:cNvPr id="3" name="Content Placeholder 2">
+            <a:extLst>
+              <a:ext uri="{FF2B5EF4-FFF2-40B4-BE49-F238E27FC236}">
+                <a16:creationId xmlns:a16="http://schemas.microsoft.com/office/drawing/2014/main" id="{E911E89A-3809-45D9-B52B-06FE3FB5AA0B}"/>
+              </a:ext>
+            </a:extLst>
+          </p:cNvPr>
+          <p:cNvSpPr>
+            <a:spLocks noGrp="1"/>
+          </p:cNvSpPr>
+          <p:nvPr>
+            <p:ph idx="1"/>
+          </p:nvPr>
+        </p:nvSpPr>
+        <p:spPr/>
+        <p:txBody>
+          <a:bodyPr/>
+          <a:lstStyle/>
+          <a:p>
+            <a:endParaRPr lang="en-US"/>
+          </a:p>
+        </p:txBody>
+      </p:sp>
+      <p:pic>
+        <p:nvPicPr>
+          <p:cNvPr id="5" name="Picture 4">
+            <a:extLst>
+              <a:ext uri="{FF2B5EF4-FFF2-40B4-BE49-F238E27FC236}">
+                <a16:creationId xmlns:a16="http://schemas.microsoft.com/office/drawing/2014/main" id="{48D8E99D-720D-4274-B7B3-E7D9D4B1ED8B}"/>
+              </a:ext>
+            </a:extLst>
+          </p:cNvPr>
+          <p:cNvPicPr>
+            <a:picLocks noChangeAspect="1"/>
+          </p:cNvPicPr>
+          <p:nvPr/>
+        </p:nvPicPr>
+        <p:blipFill>
+          <a:blip r:embed="rId2"/>
+          <a:stretch>
+            <a:fillRect/>
+          </a:stretch>
+        </p:blipFill>
+        <p:spPr>
+          <a:xfrm>
+            <a:off x="253093" y="2458212"/>
+            <a:ext cx="4457700" cy="2628900"/>
+          </a:xfrm>
+          <a:prstGeom prst="rect">
+            <a:avLst/>
+          </a:prstGeom>
+        </p:spPr>
+      </p:pic>
+      <p:pic>
+        <p:nvPicPr>
+          <p:cNvPr id="7" name="Picture 6">
+            <a:extLst>
+              <a:ext uri="{FF2B5EF4-FFF2-40B4-BE49-F238E27FC236}">
+                <a16:creationId xmlns:a16="http://schemas.microsoft.com/office/drawing/2014/main" id="{1DB7ACCA-2048-4923-B001-220693FC5C0C}"/>
+              </a:ext>
+            </a:extLst>
+          </p:cNvPr>
+          <p:cNvPicPr>
+            <a:picLocks noChangeAspect="1"/>
+          </p:cNvPicPr>
+          <p:nvPr/>
+        </p:nvPicPr>
+        <p:blipFill>
+          <a:blip r:embed="rId3"/>
+          <a:stretch>
+            <a:fillRect/>
+          </a:stretch>
+        </p:blipFill>
+        <p:spPr>
+          <a:xfrm>
+            <a:off x="4932816" y="2333244"/>
+            <a:ext cx="6448425" cy="2943225"/>
+          </a:xfrm>
+          <a:prstGeom prst="rect">
+            <a:avLst/>
+          </a:prstGeom>
+        </p:spPr>
+      </p:pic>
+    </p:spTree>
+    <p:extLst>
+      <p:ext uri="{BB962C8B-B14F-4D97-AF65-F5344CB8AC3E}">
+        <p14:creationId xmlns:p14="http://schemas.microsoft.com/office/powerpoint/2010/main" val="845862543"/>
       </p:ext>
     </p:extLst>
   </p:cSld>

</xml_diff>